<commit_message>
update for new pvsm
</commit_message>
<xml_diff>
--- a/2019-11_SC19/workflow_powerpoint/Cinema_Workflow_PV_Export.pptx
+++ b/2019-11_SC19/workflow_powerpoint/Cinema_Workflow_PV_Export.pptx
@@ -5,7 +5,7 @@
     <p:sldMasterId id="2147483660" r:id="rId1"/>
   </p:sldMasterIdLst>
   <p:notesMasterIdLst>
-    <p:notesMasterId r:id="rId8"/>
+    <p:notesMasterId r:id="rId9"/>
   </p:notesMasterIdLst>
   <p:sldIdLst>
     <p:sldId id="260" r:id="rId2"/>
@@ -13,7 +13,8 @@
     <p:sldId id="275" r:id="rId4"/>
     <p:sldId id="276" r:id="rId5"/>
     <p:sldId id="277" r:id="rId6"/>
-    <p:sldId id="278" r:id="rId7"/>
+    <p:sldId id="279" r:id="rId7"/>
+    <p:sldId id="278" r:id="rId8"/>
   </p:sldIdLst>
   <p:sldSz cx="12192000" cy="6858000"/>
   <p:notesSz cx="6858000" cy="9144000"/>
@@ -886,6 +887,93 @@
             <a:fld id="{DD061B8F-9DBE-BE4E-94EF-2696E7101F86}" type="slidenum">
               <a:rPr lang="en-US" smtClean="0"/>
               <a:t>6</a:t>
+            </a:fld>
+            <a:endParaRPr lang="en-US"/>
+          </a:p>
+        </p:txBody>
+      </p:sp>
+    </p:spTree>
+    <p:extLst>
+      <p:ext uri="{BB962C8B-B14F-4D97-AF65-F5344CB8AC3E}">
+        <p14:creationId xmlns:p14="http://schemas.microsoft.com/office/powerpoint/2010/main" val="2103087455"/>
+      </p:ext>
+    </p:extLst>
+  </p:cSld>
+  <p:clrMapOvr>
+    <a:masterClrMapping/>
+  </p:clrMapOvr>
+</p:notes>
+</file>
+
+<file path=ppt/notesSlides/notesSlide6.xml><?xml version="1.0" encoding="utf-8"?>
+<p:notes xmlns:a="http://schemas.openxmlformats.org/drawingml/2006/main" xmlns:r="http://schemas.openxmlformats.org/officeDocument/2006/relationships" xmlns:p="http://schemas.openxmlformats.org/presentationml/2006/main">
+  <p:cSld>
+    <p:spTree>
+      <p:nvGrpSpPr>
+        <p:cNvPr id="1" name=""/>
+        <p:cNvGrpSpPr/>
+        <p:nvPr/>
+      </p:nvGrpSpPr>
+      <p:grpSpPr>
+        <a:xfrm>
+          <a:off x="0" y="0"/>
+          <a:ext cx="0" cy="0"/>
+          <a:chOff x="0" y="0"/>
+          <a:chExt cx="0" cy="0"/>
+        </a:xfrm>
+      </p:grpSpPr>
+      <p:sp>
+        <p:nvSpPr>
+          <p:cNvPr id="2" name="Slide Image Placeholder 1"/>
+          <p:cNvSpPr>
+            <a:spLocks noGrp="1" noRot="1" noChangeAspect="1"/>
+          </p:cNvSpPr>
+          <p:nvPr>
+            <p:ph type="sldImg"/>
+          </p:nvPr>
+        </p:nvSpPr>
+        <p:spPr/>
+      </p:sp>
+      <p:sp>
+        <p:nvSpPr>
+          <p:cNvPr id="3" name="Notes Placeholder 2"/>
+          <p:cNvSpPr>
+            <a:spLocks noGrp="1"/>
+          </p:cNvSpPr>
+          <p:nvPr>
+            <p:ph type="body" idx="1"/>
+          </p:nvPr>
+        </p:nvSpPr>
+        <p:spPr/>
+        <p:txBody>
+          <a:bodyPr/>
+          <a:lstStyle/>
+          <a:p>
+            <a:r>
+              <a:rPr lang="en-US" dirty="0"/>
+              <a:t>Gives a list of all cinema commands. Ensure that the image and cv commands are listed.</a:t>
+            </a:r>
+          </a:p>
+        </p:txBody>
+      </p:sp>
+      <p:sp>
+        <p:nvSpPr>
+          <p:cNvPr id="4" name="Slide Number Placeholder 3"/>
+          <p:cNvSpPr>
+            <a:spLocks noGrp="1"/>
+          </p:cNvSpPr>
+          <p:nvPr>
+            <p:ph type="sldNum" sz="quarter" idx="5"/>
+          </p:nvPr>
+        </p:nvSpPr>
+        <p:spPr/>
+        <p:txBody>
+          <a:bodyPr/>
+          <a:lstStyle/>
+          <a:p>
+            <a:fld id="{DD061B8F-9DBE-BE4E-94EF-2696E7101F86}" type="slidenum">
+              <a:rPr lang="en-US" smtClean="0"/>
+              <a:t>7</a:t>
             </a:fld>
             <a:endParaRPr lang="en-US"/>
           </a:p>
@@ -5657,10 +5745,10 @@
       </p:sp>
       <p:pic>
         <p:nvPicPr>
-          <p:cNvPr id="18" name="Picture 17">
+          <p:cNvPr id="11" name="Picture 10">
             <a:extLst>
               <a:ext uri="{FF2B5EF4-FFF2-40B4-BE49-F238E27FC236}">
-                <a16:creationId xmlns:a16="http://schemas.microsoft.com/office/drawing/2014/main" id="{64C22C11-749E-BA45-8B61-10E0A0233D6E}"/>
+                <a16:creationId xmlns:a16="http://schemas.microsoft.com/office/drawing/2014/main" id="{7E4BA57F-87B9-9041-A530-53C4C989595E}"/>
               </a:ext>
             </a:extLst>
           </p:cNvPr>
@@ -5677,8 +5765,8 @@
         </p:blipFill>
         <p:spPr>
           <a:xfrm>
-            <a:off x="137531" y="1353671"/>
-            <a:ext cx="7244461" cy="4966167"/>
+            <a:off x="30058" y="1355952"/>
+            <a:ext cx="7552771" cy="4963886"/>
           </a:xfrm>
           <a:prstGeom prst="rect">
             <a:avLst/>
@@ -5729,7 +5817,7 @@
         </p:nvSpPr>
         <p:spPr>
           <a:xfrm>
-            <a:off x="1013254" y="1229968"/>
+            <a:off x="1078569" y="1008153"/>
             <a:ext cx="6301946" cy="461665"/>
           </a:xfrm>
           <a:prstGeom prst="rect">
@@ -5812,7 +5900,7 @@
         </p:nvSpPr>
         <p:spPr>
           <a:xfrm>
-            <a:off x="1135592" y="1975945"/>
+            <a:off x="1078569" y="1530822"/>
             <a:ext cx="6301946" cy="2131353"/>
           </a:xfrm>
           <a:prstGeom prst="rect">
@@ -5942,7 +6030,7 @@
                 <a:latin typeface="Courier New" panose="02070309020205020404" pitchFamily="49" charset="0"/>
                 <a:cs typeface="Courier New" panose="02070309020205020404" pitchFamily="49" charset="0"/>
               </a:rPr>
-              <a:t>/5.7.0</a:t>
+              <a:t>/5.7.1</a:t>
             </a:r>
           </a:p>
           <a:p>
@@ -5997,54 +6085,12 @@
           </a:p>
         </p:txBody>
       </p:sp>
-      <p:sp>
-        <p:nvSpPr>
-          <p:cNvPr id="23" name="TextBox 22">
+      <p:pic>
+        <p:nvPicPr>
+          <p:cNvPr id="9" name="Picture 8">
             <a:extLst>
               <a:ext uri="{FF2B5EF4-FFF2-40B4-BE49-F238E27FC236}">
-                <a16:creationId xmlns:a16="http://schemas.microsoft.com/office/drawing/2014/main" id="{727C7C0E-4461-E741-8D69-FE6770A69600}"/>
-              </a:ext>
-            </a:extLst>
-          </p:cNvPr>
-          <p:cNvSpPr txBox="1"/>
-          <p:nvPr/>
-        </p:nvSpPr>
-        <p:spPr>
-          <a:xfrm>
-            <a:off x="1013254" y="4649518"/>
-            <a:ext cx="6857202" cy="461665"/>
-          </a:xfrm>
-          <a:prstGeom prst="rect">
-            <a:avLst/>
-          </a:prstGeom>
-          <a:solidFill>
-            <a:schemeClr val="bg2"/>
-          </a:solidFill>
-        </p:spPr>
-        <p:txBody>
-          <a:bodyPr wrap="square" rtlCol="0">
-            <a:spAutoFit/>
-          </a:bodyPr>
-          <a:lstStyle/>
-          <a:p>
-            <a:r>
-              <a:rPr lang="en-US" sz="2400" dirty="0"/>
-              <a:t>In the Pipeline Browser, click to highlight </a:t>
-            </a:r>
-            <a:r>
-              <a:rPr lang="en-US" sz="2400" dirty="0" err="1"/>
-              <a:t>nxy.pvd</a:t>
-            </a:r>
-            <a:endParaRPr lang="en-US" sz="2400" dirty="0"/>
-          </a:p>
-        </p:txBody>
-      </p:sp>
-      <p:pic>
-        <p:nvPicPr>
-          <p:cNvPr id="3" name="Picture 2">
-            <a:extLst>
-              <a:ext uri="{FF2B5EF4-FFF2-40B4-BE49-F238E27FC236}">
-                <a16:creationId xmlns:a16="http://schemas.microsoft.com/office/drawing/2014/main" id="{C1E160AE-C9F2-DF47-8E1C-AF9BC211B9A3}"/>
+                <a16:creationId xmlns:a16="http://schemas.microsoft.com/office/drawing/2014/main" id="{C1DDE81E-286F-E646-98F1-4EF5D61ED8C9}"/>
               </a:ext>
             </a:extLst>
           </p:cNvPr>
@@ -6061,8 +6107,8 @@
         </p:blipFill>
         <p:spPr>
           <a:xfrm>
-            <a:off x="7870456" y="797858"/>
-            <a:ext cx="2870635" cy="5827059"/>
+            <a:off x="8098971" y="3451027"/>
+            <a:ext cx="3619911" cy="3383646"/>
           </a:xfrm>
           <a:prstGeom prst="rect">
             <a:avLst/>
@@ -6071,10 +6117,10 @@
       </p:pic>
       <p:sp>
         <p:nvSpPr>
-          <p:cNvPr id="2" name="Frame 1">
+          <p:cNvPr id="8" name="Frame 7">
             <a:extLst>
               <a:ext uri="{FF2B5EF4-FFF2-40B4-BE49-F238E27FC236}">
-                <a16:creationId xmlns:a16="http://schemas.microsoft.com/office/drawing/2014/main" id="{260C59E1-99D0-214C-880F-043FEACEB4D7}"/>
+                <a16:creationId xmlns:a16="http://schemas.microsoft.com/office/drawing/2014/main" id="{7E8F06C6-23F6-7941-99E6-38074B61AA59}"/>
               </a:ext>
             </a:extLst>
           </p:cNvPr>
@@ -6083,8 +6129,251 @@
         </p:nvSpPr>
         <p:spPr>
           <a:xfrm>
-            <a:off x="7748117" y="737062"/>
-            <a:ext cx="1407033" cy="801806"/>
+            <a:off x="7870456" y="3273536"/>
+            <a:ext cx="1854123" cy="962561"/>
+          </a:xfrm>
+          <a:prstGeom prst="frame">
+            <a:avLst>
+              <a:gd name="adj1" fmla="val 8328"/>
+            </a:avLst>
+          </a:prstGeom>
+          <a:solidFill>
+            <a:srgbClr val="FF0000"/>
+          </a:solidFill>
+          <a:ln>
+            <a:solidFill>
+              <a:srgbClr val="FF0000"/>
+            </a:solidFill>
+          </a:ln>
+          <a:effectLst>
+            <a:outerShdw blurRad="44450" dist="27940" dir="5400000" algn="ctr">
+              <a:srgbClr val="000000">
+                <a:alpha val="32000"/>
+              </a:srgbClr>
+            </a:outerShdw>
+          </a:effectLst>
+        </p:spPr>
+        <p:txBody>
+          <a:bodyPr rot="0" spcFirstLastPara="0" vertOverflow="overflow" horzOverflow="overflow" vert="horz" wrap="square" lIns="121851" tIns="60925" rIns="121851" bIns="60925" numCol="1" spcCol="0" rtlCol="0" fromWordArt="0" anchor="ctr" anchorCtr="0" forceAA="0" compatLnSpc="1">
+            <a:prstTxWarp prst="textNoShape">
+              <a:avLst/>
+            </a:prstTxWarp>
+            <a:noAutofit/>
+          </a:bodyPr>
+          <a:lstStyle/>
+          <a:p>
+            <a:pPr algn="ctr">
+              <a:lnSpc>
+                <a:spcPct val="90000"/>
+              </a:lnSpc>
+            </a:pPr>
+            <a:endParaRPr lang="en-US" sz="2000" dirty="0">
+              <a:solidFill>
+                <a:schemeClr val="bg1"/>
+              </a:solidFill>
+            </a:endParaRPr>
+          </a:p>
+        </p:txBody>
+      </p:sp>
+      <p:pic>
+        <p:nvPicPr>
+          <p:cNvPr id="6" name="Picture 5">
+            <a:extLst>
+              <a:ext uri="{FF2B5EF4-FFF2-40B4-BE49-F238E27FC236}">
+                <a16:creationId xmlns:a16="http://schemas.microsoft.com/office/drawing/2014/main" id="{6555CAFA-B4A0-0A43-8F89-7BAABBAC3C73}"/>
+              </a:ext>
+            </a:extLst>
+          </p:cNvPr>
+          <p:cNvPicPr>
+            <a:picLocks noChangeAspect="1"/>
+          </p:cNvPicPr>
+          <p:nvPr/>
+        </p:nvPicPr>
+        <p:blipFill>
+          <a:blip r:embed="rId4"/>
+          <a:stretch>
+            <a:fillRect/>
+          </a:stretch>
+        </p:blipFill>
+        <p:spPr>
+          <a:xfrm>
+            <a:off x="2538527" y="3723180"/>
+            <a:ext cx="3930775" cy="2828814"/>
+          </a:xfrm>
+          <a:prstGeom prst="rect">
+            <a:avLst/>
+          </a:prstGeom>
+        </p:spPr>
+      </p:pic>
+      <p:sp>
+        <p:nvSpPr>
+          <p:cNvPr id="12" name="TextBox 11">
+            <a:extLst>
+              <a:ext uri="{FF2B5EF4-FFF2-40B4-BE49-F238E27FC236}">
+                <a16:creationId xmlns:a16="http://schemas.microsoft.com/office/drawing/2014/main" id="{F3AED0B8-1209-6E46-AB03-D870B42E1670}"/>
+              </a:ext>
+            </a:extLst>
+          </p:cNvPr>
+          <p:cNvSpPr txBox="1"/>
+          <p:nvPr/>
+        </p:nvSpPr>
+        <p:spPr>
+          <a:xfrm>
+            <a:off x="8595842" y="4727013"/>
+            <a:ext cx="2479594" cy="1200329"/>
+          </a:xfrm>
+          <a:prstGeom prst="rect">
+            <a:avLst/>
+          </a:prstGeom>
+          <a:solidFill>
+            <a:schemeClr val="bg1">
+              <a:lumMod val="85000"/>
+            </a:schemeClr>
+          </a:solidFill>
+        </p:spPr>
+        <p:txBody>
+          <a:bodyPr wrap="square" rtlCol="0">
+            <a:spAutoFit/>
+          </a:bodyPr>
+          <a:lstStyle/>
+          <a:p>
+            <a:r>
+              <a:rPr lang="en-US" sz="2400" dirty="0"/>
+              <a:t>In the Pipeline Browser, click to highlight </a:t>
+            </a:r>
+            <a:r>
+              <a:rPr lang="en-US" sz="2400" dirty="0" err="1"/>
+              <a:t>nxy.pvd</a:t>
+            </a:r>
+            <a:endParaRPr lang="en-US" sz="2400" dirty="0"/>
+          </a:p>
+        </p:txBody>
+      </p:sp>
+      <p:sp>
+        <p:nvSpPr>
+          <p:cNvPr id="23" name="TextBox 22">
+            <a:extLst>
+              <a:ext uri="{FF2B5EF4-FFF2-40B4-BE49-F238E27FC236}">
+                <a16:creationId xmlns:a16="http://schemas.microsoft.com/office/drawing/2014/main" id="{727C7C0E-4461-E741-8D69-FE6770A69600}"/>
+              </a:ext>
+            </a:extLst>
+          </p:cNvPr>
+          <p:cNvSpPr txBox="1"/>
+          <p:nvPr/>
+        </p:nvSpPr>
+        <p:spPr>
+          <a:xfrm>
+            <a:off x="2963352" y="4542348"/>
+            <a:ext cx="2187146" cy="1569660"/>
+          </a:xfrm>
+          <a:prstGeom prst="rect">
+            <a:avLst/>
+          </a:prstGeom>
+          <a:solidFill>
+            <a:schemeClr val="bg2"/>
+          </a:solidFill>
+        </p:spPr>
+        <p:txBody>
+          <a:bodyPr wrap="square" rtlCol="0">
+            <a:spAutoFit/>
+          </a:bodyPr>
+          <a:lstStyle/>
+          <a:p>
+            <a:r>
+              <a:rPr lang="en-US" sz="2400" dirty="0"/>
+              <a:t>Click </a:t>
+            </a:r>
+            <a:r>
+              <a:rPr lang="en-US" sz="2400" b="1" dirty="0"/>
+              <a:t>OK</a:t>
+            </a:r>
+            <a:r>
+              <a:rPr lang="en-US" sz="2400" dirty="0"/>
+              <a:t> to </a:t>
+            </a:r>
+            <a:r>
+              <a:rPr lang="en-US" sz="2400" b="1" dirty="0"/>
+              <a:t>Use File Names from State</a:t>
+            </a:r>
+          </a:p>
+        </p:txBody>
+      </p:sp>
+      <p:sp>
+        <p:nvSpPr>
+          <p:cNvPr id="13" name="Frame 12">
+            <a:extLst>
+              <a:ext uri="{FF2B5EF4-FFF2-40B4-BE49-F238E27FC236}">
+                <a16:creationId xmlns:a16="http://schemas.microsoft.com/office/drawing/2014/main" id="{785193BA-1AF7-DD41-B9F0-62D57ABD4E99}"/>
+              </a:ext>
+            </a:extLst>
+          </p:cNvPr>
+          <p:cNvSpPr/>
+          <p:nvPr/>
+        </p:nvSpPr>
+        <p:spPr>
+          <a:xfrm>
+            <a:off x="5094514" y="6000907"/>
+            <a:ext cx="1430772" cy="685657"/>
+          </a:xfrm>
+          <a:prstGeom prst="frame">
+            <a:avLst>
+              <a:gd name="adj1" fmla="val 8328"/>
+            </a:avLst>
+          </a:prstGeom>
+          <a:solidFill>
+            <a:srgbClr val="FF0000"/>
+          </a:solidFill>
+          <a:ln>
+            <a:solidFill>
+              <a:srgbClr val="FF0000"/>
+            </a:solidFill>
+          </a:ln>
+          <a:effectLst>
+            <a:outerShdw blurRad="44450" dist="27940" dir="5400000" algn="ctr">
+              <a:srgbClr val="000000">
+                <a:alpha val="32000"/>
+              </a:srgbClr>
+            </a:outerShdw>
+          </a:effectLst>
+        </p:spPr>
+        <p:txBody>
+          <a:bodyPr rot="0" spcFirstLastPara="0" vertOverflow="overflow" horzOverflow="overflow" vert="horz" wrap="square" lIns="121851" tIns="60925" rIns="121851" bIns="60925" numCol="1" spcCol="0" rtlCol="0" fromWordArt="0" anchor="ctr" anchorCtr="0" forceAA="0" compatLnSpc="1">
+            <a:prstTxWarp prst="textNoShape">
+              <a:avLst/>
+            </a:prstTxWarp>
+            <a:noAutofit/>
+          </a:bodyPr>
+          <a:lstStyle/>
+          <a:p>
+            <a:pPr algn="ctr">
+              <a:lnSpc>
+                <a:spcPct val="90000"/>
+              </a:lnSpc>
+            </a:pPr>
+            <a:endParaRPr lang="en-US" sz="2000" dirty="0">
+              <a:solidFill>
+                <a:schemeClr val="bg1"/>
+              </a:solidFill>
+            </a:endParaRPr>
+          </a:p>
+        </p:txBody>
+      </p:sp>
+      <p:sp>
+        <p:nvSpPr>
+          <p:cNvPr id="14" name="Frame 13">
+            <a:extLst>
+              <a:ext uri="{FF2B5EF4-FFF2-40B4-BE49-F238E27FC236}">
+                <a16:creationId xmlns:a16="http://schemas.microsoft.com/office/drawing/2014/main" id="{AAE55568-66E3-3E42-B37D-7E80EF3F1924}"/>
+              </a:ext>
+            </a:extLst>
+          </p:cNvPr>
+          <p:cNvSpPr/>
+          <p:nvPr/>
+        </p:nvSpPr>
+        <p:spPr>
+          <a:xfrm>
+            <a:off x="2211493" y="3897634"/>
+            <a:ext cx="4323490" cy="470261"/>
           </a:xfrm>
           <a:prstGeom prst="frame">
             <a:avLst>
@@ -6159,231 +6448,12 @@
           <a:chExt cx="0" cy="0"/>
         </a:xfrm>
       </p:grpSpPr>
-      <p:sp>
-        <p:nvSpPr>
-          <p:cNvPr id="4" name="TextBox 3">
+      <p:pic>
+        <p:nvPicPr>
+          <p:cNvPr id="7" name="Picture 6">
             <a:extLst>
               <a:ext uri="{FF2B5EF4-FFF2-40B4-BE49-F238E27FC236}">
-                <a16:creationId xmlns:a16="http://schemas.microsoft.com/office/drawing/2014/main" id="{682F039E-BE18-CC4F-B105-04ED2B522697}"/>
-              </a:ext>
-            </a:extLst>
-          </p:cNvPr>
-          <p:cNvSpPr txBox="1"/>
-          <p:nvPr/>
-        </p:nvSpPr>
-        <p:spPr>
-          <a:xfrm>
-            <a:off x="1013254" y="1229968"/>
-            <a:ext cx="5172393" cy="830997"/>
-          </a:xfrm>
-          <a:prstGeom prst="rect">
-            <a:avLst/>
-          </a:prstGeom>
-          <a:solidFill>
-            <a:schemeClr val="bg2"/>
-          </a:solidFill>
-        </p:spPr>
-        <p:txBody>
-          <a:bodyPr wrap="square" rtlCol="0">
-            <a:spAutoFit/>
-          </a:bodyPr>
-          <a:lstStyle/>
-          <a:p>
-            <a:r>
-              <a:rPr lang="en-US" sz="2400" dirty="0"/>
-              <a:t>Setup Cinema Database Export in </a:t>
-            </a:r>
-            <a:r>
-              <a:rPr lang="en-US" sz="2400" b="1" dirty="0"/>
-              <a:t>Export Inspector View</a:t>
-            </a:r>
-          </a:p>
-        </p:txBody>
-      </p:sp>
-      <p:sp>
-        <p:nvSpPr>
-          <p:cNvPr id="15" name="Title 1">
-            <a:extLst>
-              <a:ext uri="{FF2B5EF4-FFF2-40B4-BE49-F238E27FC236}">
-                <a16:creationId xmlns:a16="http://schemas.microsoft.com/office/drawing/2014/main" id="{D455D1A1-141D-124F-8A8D-31B58287F0F0}"/>
-              </a:ext>
-            </a:extLst>
-          </p:cNvPr>
-          <p:cNvSpPr>
-            <a:spLocks noGrp="1"/>
-          </p:cNvSpPr>
-          <p:nvPr>
-            <p:ph type="title"/>
-          </p:nvPr>
-        </p:nvSpPr>
-        <p:spPr>
-          <a:xfrm>
-            <a:off x="838200" y="365125"/>
-            <a:ext cx="10515600" cy="662781"/>
-          </a:xfrm>
-        </p:spPr>
-        <p:txBody>
-          <a:bodyPr/>
-          <a:lstStyle/>
-          <a:p>
-            <a:r>
-              <a:rPr lang="en-US" dirty="0"/>
-              <a:t>Cinema Workflow Example: Export a CDB from </a:t>
-            </a:r>
-            <a:r>
-              <a:rPr lang="en-US" dirty="0" err="1"/>
-              <a:t>ParaView</a:t>
-            </a:r>
-            <a:endParaRPr lang="en-US" dirty="0"/>
-          </a:p>
-        </p:txBody>
-      </p:sp>
-      <p:sp>
-        <p:nvSpPr>
-          <p:cNvPr id="5" name="TextBox 4">
-            <a:extLst>
-              <a:ext uri="{FF2B5EF4-FFF2-40B4-BE49-F238E27FC236}">
-                <a16:creationId xmlns:a16="http://schemas.microsoft.com/office/drawing/2014/main" id="{B76FB099-B43C-434C-B8EA-A8E84595F15E}"/>
-              </a:ext>
-            </a:extLst>
-          </p:cNvPr>
-          <p:cNvSpPr txBox="1"/>
-          <p:nvPr/>
-        </p:nvSpPr>
-        <p:spPr>
-          <a:xfrm>
-            <a:off x="838199" y="3023521"/>
-            <a:ext cx="6811537" cy="2843855"/>
-          </a:xfrm>
-          <a:prstGeom prst="rect">
-            <a:avLst/>
-          </a:prstGeom>
-          <a:noFill/>
-        </p:spPr>
-        <p:txBody>
-          <a:bodyPr wrap="square" lIns="118872" tIns="91440" rIns="118872" bIns="91440" rtlCol="0" anchor="t" anchorCtr="0">
-            <a:spAutoFit/>
-          </a:bodyPr>
-          <a:lstStyle/>
-          <a:p>
-            <a:pPr>
-              <a:lnSpc>
-                <a:spcPct val="90000"/>
-              </a:lnSpc>
-            </a:pPr>
-            <a:r>
-              <a:rPr lang="en-US" sz="2400" dirty="0"/>
-              <a:t>Under </a:t>
-            </a:r>
-            <a:r>
-              <a:rPr lang="en-US" sz="2400" b="1" dirty="0"/>
-              <a:t>Image Extracts</a:t>
-            </a:r>
-            <a:r>
-              <a:rPr lang="en-US" sz="2400" dirty="0"/>
-              <a:t>, select the choices from the dropdown menus:</a:t>
-            </a:r>
-          </a:p>
-          <a:p>
-            <a:pPr>
-              <a:lnSpc>
-                <a:spcPct val="90000"/>
-              </a:lnSpc>
-            </a:pPr>
-            <a:endParaRPr lang="en-US" sz="2400" dirty="0"/>
-          </a:p>
-          <a:p>
-            <a:pPr marL="342900" indent="-342900">
-              <a:lnSpc>
-                <a:spcPct val="90000"/>
-              </a:lnSpc>
-              <a:buFont typeface="Wingdings" pitchFamily="2" charset="2"/>
-              <a:buChar char="Ø"/>
-            </a:pPr>
-            <a:r>
-              <a:rPr lang="en-US" sz="2400" dirty="0">
-                <a:latin typeface="Courier New" panose="02070309020205020404" pitchFamily="49" charset="0"/>
-                <a:cs typeface="Courier New" panose="02070309020205020404" pitchFamily="49" charset="0"/>
-              </a:rPr>
-              <a:t>RenderView1</a:t>
-            </a:r>
-          </a:p>
-          <a:p>
-            <a:pPr marL="342900" indent="-342900">
-              <a:lnSpc>
-                <a:spcPct val="90000"/>
-              </a:lnSpc>
-              <a:buFont typeface="Wingdings" pitchFamily="2" charset="2"/>
-              <a:buChar char="Ø"/>
-            </a:pPr>
-            <a:r>
-              <a:rPr lang="en-US" sz="2400" dirty="0">
-                <a:latin typeface="Courier New" panose="02070309020205020404" pitchFamily="49" charset="0"/>
-                <a:cs typeface="Courier New" panose="02070309020205020404" pitchFamily="49" charset="0"/>
-              </a:rPr>
-              <a:t>Cinema image database (*.</a:t>
-            </a:r>
-            <a:r>
-              <a:rPr lang="en-US" sz="2400" dirty="0" err="1">
-                <a:latin typeface="Courier New" panose="02070309020205020404" pitchFamily="49" charset="0"/>
-                <a:cs typeface="Courier New" panose="02070309020205020404" pitchFamily="49" charset="0"/>
-              </a:rPr>
-              <a:t>cdb</a:t>
-            </a:r>
-            <a:r>
-              <a:rPr lang="en-US" sz="2400" dirty="0">
-                <a:latin typeface="Courier New" panose="02070309020205020404" pitchFamily="49" charset="0"/>
-                <a:cs typeface="Courier New" panose="02070309020205020404" pitchFamily="49" charset="0"/>
-              </a:rPr>
-              <a:t>)</a:t>
-            </a:r>
-          </a:p>
-          <a:p>
-            <a:pPr marL="342900" indent="-342900">
-              <a:lnSpc>
-                <a:spcPct val="90000"/>
-              </a:lnSpc>
-              <a:buFont typeface="Wingdings" pitchFamily="2" charset="2"/>
-              <a:buChar char="Ø"/>
-            </a:pPr>
-            <a:endParaRPr lang="en-US" sz="2400" dirty="0">
-              <a:latin typeface="Courier New" panose="02070309020205020404" pitchFamily="49" charset="0"/>
-              <a:cs typeface="Courier New" panose="02070309020205020404" pitchFamily="49" charset="0"/>
-            </a:endParaRPr>
-          </a:p>
-          <a:p>
-            <a:pPr>
-              <a:lnSpc>
-                <a:spcPct val="90000"/>
-              </a:lnSpc>
-            </a:pPr>
-            <a:r>
-              <a:rPr lang="en-US" sz="2400" dirty="0">
-                <a:cs typeface="Courier New" panose="02070309020205020404" pitchFamily="49" charset="0"/>
-              </a:rPr>
-              <a:t>Click on the checkbox and use the ellipses menu to open the </a:t>
-            </a:r>
-            <a:r>
-              <a:rPr lang="en-US" sz="2400" b="1" dirty="0">
-                <a:cs typeface="Courier New" panose="02070309020205020404" pitchFamily="49" charset="0"/>
-              </a:rPr>
-              <a:t>Save Screenshots</a:t>
-            </a:r>
-            <a:r>
-              <a:rPr lang="en-US" sz="2400" dirty="0">
-                <a:cs typeface="Courier New" panose="02070309020205020404" pitchFamily="49" charset="0"/>
-              </a:rPr>
-              <a:t> menu</a:t>
-            </a:r>
-          </a:p>
-        </p:txBody>
-      </p:sp>
-      <p:pic>
-        <p:nvPicPr>
-          <p:cNvPr id="8" name="Picture 7">
-            <a:extLst>
-              <a:ext uri="{FF2B5EF4-FFF2-40B4-BE49-F238E27FC236}">
-                <a16:creationId xmlns:a16="http://schemas.microsoft.com/office/drawing/2014/main" id="{AD520912-734A-F948-B564-63EEDC8A6A74}"/>
+                <a16:creationId xmlns:a16="http://schemas.microsoft.com/office/drawing/2014/main" id="{3529EC7D-2B84-6244-BB15-1E4C2B566310}"/>
               </a:ext>
             </a:extLst>
           </p:cNvPr>
@@ -6400,8 +6470,8 @@
         </p:blipFill>
         <p:spPr>
           <a:xfrm>
-            <a:off x="8495759" y="1234890"/>
-            <a:ext cx="3243033" cy="5369859"/>
+            <a:off x="6096000" y="1422400"/>
+            <a:ext cx="5880100" cy="4013200"/>
           </a:xfrm>
           <a:prstGeom prst="rect">
             <a:avLst/>
@@ -6410,61 +6480,220 @@
       </p:pic>
       <p:sp>
         <p:nvSpPr>
-          <p:cNvPr id="9" name="Frame 8">
+          <p:cNvPr id="4" name="TextBox 3">
             <a:extLst>
               <a:ext uri="{FF2B5EF4-FFF2-40B4-BE49-F238E27FC236}">
-                <a16:creationId xmlns:a16="http://schemas.microsoft.com/office/drawing/2014/main" id="{CF2DBEF6-E473-734D-A45A-CAFFCC04A64A}"/>
+                <a16:creationId xmlns:a16="http://schemas.microsoft.com/office/drawing/2014/main" id="{682F039E-BE18-CC4F-B105-04ED2B522697}"/>
               </a:ext>
             </a:extLst>
           </p:cNvPr>
-          <p:cNvSpPr/>
+          <p:cNvSpPr txBox="1"/>
           <p:nvPr/>
         </p:nvSpPr>
         <p:spPr>
           <a:xfrm>
-            <a:off x="8283376" y="3428999"/>
-            <a:ext cx="1395884" cy="513121"/>
-          </a:xfrm>
-          <a:prstGeom prst="frame">
-            <a:avLst>
-              <a:gd name="adj1" fmla="val 8328"/>
-            </a:avLst>
+            <a:off x="1013254" y="1229968"/>
+            <a:ext cx="5172393" cy="830997"/>
+          </a:xfrm>
+          <a:prstGeom prst="rect">
+            <a:avLst/>
           </a:prstGeom>
           <a:solidFill>
-            <a:srgbClr val="FF0000"/>
+            <a:schemeClr val="bg2"/>
           </a:solidFill>
-          <a:ln>
-            <a:solidFill>
-              <a:srgbClr val="FF0000"/>
-            </a:solidFill>
-          </a:ln>
-          <a:effectLst>
-            <a:outerShdw blurRad="44450" dist="27940" dir="5400000" algn="ctr">
-              <a:srgbClr val="000000">
-                <a:alpha val="32000"/>
-              </a:srgbClr>
-            </a:outerShdw>
-          </a:effectLst>
-        </p:spPr>
-        <p:txBody>
-          <a:bodyPr rot="0" spcFirstLastPara="0" vertOverflow="overflow" horzOverflow="overflow" vert="horz" wrap="square" lIns="121851" tIns="60925" rIns="121851" bIns="60925" numCol="1" spcCol="0" rtlCol="0" fromWordArt="0" anchor="ctr" anchorCtr="0" forceAA="0" compatLnSpc="1">
-            <a:prstTxWarp prst="textNoShape">
-              <a:avLst/>
-            </a:prstTxWarp>
-            <a:noAutofit/>
+        </p:spPr>
+        <p:txBody>
+          <a:bodyPr wrap="square" rtlCol="0">
+            <a:spAutoFit/>
           </a:bodyPr>
           <a:lstStyle/>
           <a:p>
-            <a:pPr algn="ctr">
+            <a:r>
+              <a:rPr lang="en-US" sz="2400" dirty="0"/>
+              <a:t>Setup Cinema Database Export in </a:t>
+            </a:r>
+            <a:r>
+              <a:rPr lang="en-US" sz="2400" b="1" dirty="0"/>
+              <a:t>Export Inspector View</a:t>
+            </a:r>
+          </a:p>
+        </p:txBody>
+      </p:sp>
+      <p:sp>
+        <p:nvSpPr>
+          <p:cNvPr id="15" name="Title 1">
+            <a:extLst>
+              <a:ext uri="{FF2B5EF4-FFF2-40B4-BE49-F238E27FC236}">
+                <a16:creationId xmlns:a16="http://schemas.microsoft.com/office/drawing/2014/main" id="{D455D1A1-141D-124F-8A8D-31B58287F0F0}"/>
+              </a:ext>
+            </a:extLst>
+          </p:cNvPr>
+          <p:cNvSpPr>
+            <a:spLocks noGrp="1"/>
+          </p:cNvSpPr>
+          <p:nvPr>
+            <p:ph type="title"/>
+          </p:nvPr>
+        </p:nvSpPr>
+        <p:spPr>
+          <a:xfrm>
+            <a:off x="838200" y="365125"/>
+            <a:ext cx="10515600" cy="662781"/>
+          </a:xfrm>
+        </p:spPr>
+        <p:txBody>
+          <a:bodyPr/>
+          <a:lstStyle/>
+          <a:p>
+            <a:r>
+              <a:rPr lang="en-US" dirty="0"/>
+              <a:t>Cinema Workflow Example: Export a CDB from </a:t>
+            </a:r>
+            <a:r>
+              <a:rPr lang="en-US" dirty="0" err="1"/>
+              <a:t>ParaView</a:t>
+            </a:r>
+            <a:endParaRPr lang="en-US" dirty="0"/>
+          </a:p>
+        </p:txBody>
+      </p:sp>
+      <p:sp>
+        <p:nvSpPr>
+          <p:cNvPr id="5" name="TextBox 4">
+            <a:extLst>
+              <a:ext uri="{FF2B5EF4-FFF2-40B4-BE49-F238E27FC236}">
+                <a16:creationId xmlns:a16="http://schemas.microsoft.com/office/drawing/2014/main" id="{B76FB099-B43C-434C-B8EA-A8E84595F15E}"/>
+              </a:ext>
+            </a:extLst>
+          </p:cNvPr>
+          <p:cNvSpPr txBox="1"/>
+          <p:nvPr/>
+        </p:nvSpPr>
+        <p:spPr>
+          <a:xfrm>
+            <a:off x="548951" y="2263027"/>
+            <a:ext cx="5015510" cy="3508653"/>
+          </a:xfrm>
+          <a:prstGeom prst="rect">
+            <a:avLst/>
+          </a:prstGeom>
+          <a:noFill/>
+        </p:spPr>
+        <p:txBody>
+          <a:bodyPr wrap="square" lIns="118872" tIns="91440" rIns="118872" bIns="91440" rtlCol="0" anchor="t" anchorCtr="0">
+            <a:spAutoFit/>
+          </a:bodyPr>
+          <a:lstStyle/>
+          <a:p>
+            <a:pPr>
               <a:lnSpc>
                 <a:spcPct val="90000"/>
               </a:lnSpc>
             </a:pPr>
-            <a:endParaRPr lang="en-US" sz="2000" dirty="0">
-              <a:solidFill>
-                <a:schemeClr val="bg1"/>
-              </a:solidFill>
+            <a:r>
+              <a:rPr lang="en-US" sz="2400" dirty="0"/>
+              <a:t>Under </a:t>
+            </a:r>
+            <a:r>
+              <a:rPr lang="en-US" sz="2400" b="1" dirty="0"/>
+              <a:t>Image Extracts</a:t>
+            </a:r>
+            <a:r>
+              <a:rPr lang="en-US" sz="2400" dirty="0"/>
+              <a:t>, select the choices from the dropdown menus:</a:t>
+            </a:r>
+          </a:p>
+          <a:p>
+            <a:pPr>
+              <a:lnSpc>
+                <a:spcPct val="90000"/>
+              </a:lnSpc>
+            </a:pPr>
+            <a:endParaRPr lang="en-US" sz="2400" dirty="0"/>
+          </a:p>
+          <a:p>
+            <a:pPr marL="342900" indent="-342900">
+              <a:lnSpc>
+                <a:spcPct val="90000"/>
+              </a:lnSpc>
+              <a:buFont typeface="Wingdings" pitchFamily="2" charset="2"/>
+              <a:buChar char="Ø"/>
+            </a:pPr>
+            <a:r>
+              <a:rPr lang="en-US" sz="2400" dirty="0">
+                <a:latin typeface="Courier New" panose="02070309020205020404" pitchFamily="49" charset="0"/>
+                <a:cs typeface="Courier New" panose="02070309020205020404" pitchFamily="49" charset="0"/>
+              </a:rPr>
+              <a:t>RenderView1</a:t>
+            </a:r>
+          </a:p>
+          <a:p>
+            <a:pPr marL="342900" indent="-342900">
+              <a:lnSpc>
+                <a:spcPct val="90000"/>
+              </a:lnSpc>
+              <a:buFont typeface="Wingdings" pitchFamily="2" charset="2"/>
+              <a:buChar char="Ø"/>
+            </a:pPr>
+            <a:r>
+              <a:rPr lang="en-US" sz="2400" dirty="0">
+                <a:latin typeface="Courier New" panose="02070309020205020404" pitchFamily="49" charset="0"/>
+                <a:cs typeface="Courier New" panose="02070309020205020404" pitchFamily="49" charset="0"/>
+              </a:rPr>
+              <a:t>Cinema image database (*.</a:t>
+            </a:r>
+            <a:r>
+              <a:rPr lang="en-US" sz="2400" dirty="0" err="1">
+                <a:latin typeface="Courier New" panose="02070309020205020404" pitchFamily="49" charset="0"/>
+                <a:cs typeface="Courier New" panose="02070309020205020404" pitchFamily="49" charset="0"/>
+              </a:rPr>
+              <a:t>cdb</a:t>
+            </a:r>
+            <a:r>
+              <a:rPr lang="en-US" sz="2400" dirty="0">
+                <a:latin typeface="Courier New" panose="02070309020205020404" pitchFamily="49" charset="0"/>
+                <a:cs typeface="Courier New" panose="02070309020205020404" pitchFamily="49" charset="0"/>
+              </a:rPr>
+              <a:t>)</a:t>
+            </a:r>
+          </a:p>
+          <a:p>
+            <a:pPr marL="342900" indent="-342900">
+              <a:lnSpc>
+                <a:spcPct val="90000"/>
+              </a:lnSpc>
+              <a:buFont typeface="Wingdings" pitchFamily="2" charset="2"/>
+              <a:buChar char="Ø"/>
+            </a:pPr>
+            <a:endParaRPr lang="en-US" sz="2400" dirty="0">
+              <a:latin typeface="Courier New" panose="02070309020205020404" pitchFamily="49" charset="0"/>
+              <a:cs typeface="Courier New" panose="02070309020205020404" pitchFamily="49" charset="0"/>
             </a:endParaRPr>
+          </a:p>
+          <a:p>
+            <a:pPr>
+              <a:lnSpc>
+                <a:spcPct val="90000"/>
+              </a:lnSpc>
+            </a:pPr>
+            <a:r>
+              <a:rPr lang="en-US" sz="2400" dirty="0">
+                <a:cs typeface="Courier New" panose="02070309020205020404" pitchFamily="49" charset="0"/>
+              </a:rPr>
+              <a:t>Click on the checkbox and use the ellipses menu to open the </a:t>
+            </a:r>
+            <a:r>
+              <a:rPr lang="en-US" sz="2400" b="1" dirty="0">
+                <a:cs typeface="Courier New" panose="02070309020205020404" pitchFamily="49" charset="0"/>
+              </a:rPr>
+              <a:t>Save Screenshots</a:t>
+            </a:r>
+            <a:r>
+              <a:rPr lang="en-US" sz="2400" dirty="0">
+                <a:cs typeface="Courier New" panose="02070309020205020404" pitchFamily="49" charset="0"/>
+              </a:rPr>
+              <a:t> menu</a:t>
+            </a:r>
           </a:p>
         </p:txBody>
       </p:sp>
@@ -6482,12 +6711,12 @@
         </p:nvSpPr>
         <p:spPr>
           <a:xfrm>
-            <a:off x="8283376" y="4326673"/>
-            <a:ext cx="3581522" cy="690201"/>
+            <a:off x="5846233" y="2820081"/>
+            <a:ext cx="6264255" cy="1118779"/>
           </a:xfrm>
           <a:prstGeom prst="frame">
             <a:avLst>
-              <a:gd name="adj1" fmla="val 8328"/>
+              <a:gd name="adj1" fmla="val 4992"/>
             </a:avLst>
           </a:prstGeom>
           <a:solidFill>
@@ -7005,225 +7234,12 @@
           <a:chExt cx="0" cy="0"/>
         </a:xfrm>
       </p:grpSpPr>
-      <p:sp>
-        <p:nvSpPr>
-          <p:cNvPr id="4" name="TextBox 3">
+      <p:pic>
+        <p:nvPicPr>
+          <p:cNvPr id="19" name="Picture 18">
             <a:extLst>
               <a:ext uri="{FF2B5EF4-FFF2-40B4-BE49-F238E27FC236}">
-                <a16:creationId xmlns:a16="http://schemas.microsoft.com/office/drawing/2014/main" id="{682F039E-BE18-CC4F-B105-04ED2B522697}"/>
-              </a:ext>
-            </a:extLst>
-          </p:cNvPr>
-          <p:cNvSpPr txBox="1"/>
-          <p:nvPr/>
-        </p:nvSpPr>
-        <p:spPr>
-          <a:xfrm>
-            <a:off x="1013254" y="1229968"/>
-            <a:ext cx="5172393" cy="830997"/>
-          </a:xfrm>
-          <a:prstGeom prst="rect">
-            <a:avLst/>
-          </a:prstGeom>
-          <a:solidFill>
-            <a:schemeClr val="bg2"/>
-          </a:solidFill>
-        </p:spPr>
-        <p:txBody>
-          <a:bodyPr wrap="square" rtlCol="0">
-            <a:spAutoFit/>
-          </a:bodyPr>
-          <a:lstStyle/>
-          <a:p>
-            <a:r>
-              <a:rPr lang="en-US" sz="2400" dirty="0"/>
-              <a:t>Setup Cinema Database Export in </a:t>
-            </a:r>
-            <a:r>
-              <a:rPr lang="en-US" sz="2400" b="1" dirty="0"/>
-              <a:t>Export Inspector View</a:t>
-            </a:r>
-          </a:p>
-        </p:txBody>
-      </p:sp>
-      <p:sp>
-        <p:nvSpPr>
-          <p:cNvPr id="15" name="Title 1">
-            <a:extLst>
-              <a:ext uri="{FF2B5EF4-FFF2-40B4-BE49-F238E27FC236}">
-                <a16:creationId xmlns:a16="http://schemas.microsoft.com/office/drawing/2014/main" id="{D455D1A1-141D-124F-8A8D-31B58287F0F0}"/>
-              </a:ext>
-            </a:extLst>
-          </p:cNvPr>
-          <p:cNvSpPr>
-            <a:spLocks noGrp="1"/>
-          </p:cNvSpPr>
-          <p:nvPr>
-            <p:ph type="title"/>
-          </p:nvPr>
-        </p:nvSpPr>
-        <p:spPr>
-          <a:xfrm>
-            <a:off x="838200" y="365125"/>
-            <a:ext cx="10515600" cy="662781"/>
-          </a:xfrm>
-        </p:spPr>
-        <p:txBody>
-          <a:bodyPr/>
-          <a:lstStyle/>
-          <a:p>
-            <a:r>
-              <a:rPr lang="en-US" dirty="0"/>
-              <a:t>Cinema Workflow Example: Export a CDB from </a:t>
-            </a:r>
-            <a:r>
-              <a:rPr lang="en-US" dirty="0" err="1"/>
-              <a:t>ParaView</a:t>
-            </a:r>
-            <a:endParaRPr lang="en-US" dirty="0"/>
-          </a:p>
-        </p:txBody>
-      </p:sp>
-      <p:sp>
-        <p:nvSpPr>
-          <p:cNvPr id="9" name="TextBox 8">
-            <a:extLst>
-              <a:ext uri="{FF2B5EF4-FFF2-40B4-BE49-F238E27FC236}">
-                <a16:creationId xmlns:a16="http://schemas.microsoft.com/office/drawing/2014/main" id="{9D1CE2DF-DFA4-4E41-9E7B-43AC0EE8194F}"/>
-              </a:ext>
-            </a:extLst>
-          </p:cNvPr>
-          <p:cNvSpPr txBox="1"/>
-          <p:nvPr/>
-        </p:nvSpPr>
-        <p:spPr>
-          <a:xfrm>
-            <a:off x="1013254" y="2221133"/>
-            <a:ext cx="5961410" cy="849463"/>
-          </a:xfrm>
-          <a:prstGeom prst="rect">
-            <a:avLst/>
-          </a:prstGeom>
-          <a:noFill/>
-        </p:spPr>
-        <p:txBody>
-          <a:bodyPr wrap="square" lIns="118872" tIns="91440" rIns="118872" bIns="91440" rtlCol="0" anchor="t" anchorCtr="0">
-            <a:spAutoFit/>
-          </a:bodyPr>
-          <a:lstStyle/>
-          <a:p>
-            <a:pPr>
-              <a:lnSpc>
-                <a:spcPct val="90000"/>
-              </a:lnSpc>
-            </a:pPr>
-            <a:r>
-              <a:rPr lang="en-US" sz="2400" dirty="0"/>
-              <a:t>Under </a:t>
-            </a:r>
-            <a:r>
-              <a:rPr lang="en-US" sz="2400" b="1" dirty="0"/>
-              <a:t>Root Directory</a:t>
-            </a:r>
-            <a:r>
-              <a:rPr lang="en-US" sz="2400" dirty="0"/>
-              <a:t>, give the full path and name of the Cinema database:</a:t>
-            </a:r>
-          </a:p>
-        </p:txBody>
-      </p:sp>
-      <p:sp>
-        <p:nvSpPr>
-          <p:cNvPr id="10" name="TextBox 9">
-            <a:extLst>
-              <a:ext uri="{FF2B5EF4-FFF2-40B4-BE49-F238E27FC236}">
-                <a16:creationId xmlns:a16="http://schemas.microsoft.com/office/drawing/2014/main" id="{A1607253-FF51-6048-852F-CF4AF5A62F0A}"/>
-              </a:ext>
-            </a:extLst>
-          </p:cNvPr>
-          <p:cNvSpPr txBox="1"/>
-          <p:nvPr/>
-        </p:nvSpPr>
-        <p:spPr>
-          <a:xfrm>
-            <a:off x="588251" y="3660157"/>
-            <a:ext cx="7636107" cy="746358"/>
-          </a:xfrm>
-          <a:prstGeom prst="rect">
-            <a:avLst/>
-          </a:prstGeom>
-          <a:solidFill>
-            <a:schemeClr val="bg1">
-              <a:lumMod val="85000"/>
-            </a:schemeClr>
-          </a:solidFill>
-        </p:spPr>
-        <p:txBody>
-          <a:bodyPr wrap="square" lIns="118872" tIns="91440" rIns="118872" bIns="91440" rtlCol="0" anchor="t" anchorCtr="0">
-            <a:spAutoFit/>
-          </a:bodyPr>
-          <a:lstStyle/>
-          <a:p>
-            <a:pPr>
-              <a:lnSpc>
-                <a:spcPct val="90000"/>
-              </a:lnSpc>
-            </a:pPr>
-            <a:r>
-              <a:rPr lang="en-US" sz="2000" dirty="0">
-                <a:latin typeface="Courier New" panose="02070309020205020404" pitchFamily="49" charset="0"/>
-                <a:cs typeface="Courier New" panose="02070309020205020404" pitchFamily="49" charset="0"/>
-              </a:rPr>
-              <a:t>/home/in-situ-user/</a:t>
-            </a:r>
-            <a:r>
-              <a:rPr lang="en-US" sz="2000" dirty="0" err="1">
-                <a:latin typeface="Courier New" panose="02070309020205020404" pitchFamily="49" charset="0"/>
-                <a:cs typeface="Courier New" panose="02070309020205020404" pitchFamily="49" charset="0"/>
-              </a:rPr>
-              <a:t>cinema_tutorial</a:t>
-            </a:r>
-            <a:r>
-              <a:rPr lang="en-US" sz="2000" dirty="0">
-                <a:latin typeface="Courier New" panose="02070309020205020404" pitchFamily="49" charset="0"/>
-                <a:cs typeface="Courier New" panose="02070309020205020404" pitchFamily="49" charset="0"/>
-              </a:rPr>
-              <a:t>/</a:t>
-            </a:r>
-            <a:r>
-              <a:rPr lang="en-US" sz="2000" dirty="0" err="1">
-                <a:latin typeface="Courier New" panose="02070309020205020404" pitchFamily="49" charset="0"/>
-                <a:cs typeface="Courier New" panose="02070309020205020404" pitchFamily="49" charset="0"/>
-              </a:rPr>
-              <a:t>cinema_compare</a:t>
-            </a:r>
-            <a:r>
-              <a:rPr lang="en-US" sz="2000" dirty="0">
-                <a:latin typeface="Courier New" panose="02070309020205020404" pitchFamily="49" charset="0"/>
-                <a:cs typeface="Courier New" panose="02070309020205020404" pitchFamily="49" charset="0"/>
-              </a:rPr>
-              <a:t>/data/</a:t>
-            </a:r>
-            <a:r>
-              <a:rPr lang="en-US" sz="2000" dirty="0" err="1">
-                <a:latin typeface="Courier New" panose="02070309020205020404" pitchFamily="49" charset="0"/>
-                <a:cs typeface="Courier New" panose="02070309020205020404" pitchFamily="49" charset="0"/>
-              </a:rPr>
-              <a:t>nyx.cdb</a:t>
-            </a:r>
-            <a:endParaRPr lang="en-US" sz="2000" dirty="0">
-              <a:latin typeface="Courier New" panose="02070309020205020404" pitchFamily="49" charset="0"/>
-              <a:cs typeface="Courier New" panose="02070309020205020404" pitchFamily="49" charset="0"/>
-            </a:endParaRPr>
-          </a:p>
-        </p:txBody>
-      </p:sp>
-      <p:pic>
-        <p:nvPicPr>
-          <p:cNvPr id="3" name="Picture 2">
-            <a:extLst>
-              <a:ext uri="{FF2B5EF4-FFF2-40B4-BE49-F238E27FC236}">
-                <a16:creationId xmlns:a16="http://schemas.microsoft.com/office/drawing/2014/main" id="{1A56A5EA-0CFD-D04B-B1A3-E55CA1CE81FD}"/>
+                <a16:creationId xmlns:a16="http://schemas.microsoft.com/office/drawing/2014/main" id="{E4C4058D-C407-304A-8834-FF01C0C20077}"/>
               </a:ext>
             </a:extLst>
           </p:cNvPr>
@@ -7240,8 +7256,8 @@
         </p:blipFill>
         <p:spPr>
           <a:xfrm>
-            <a:off x="7875478" y="930252"/>
-            <a:ext cx="3731991" cy="2987324"/>
+            <a:off x="6969370" y="951222"/>
+            <a:ext cx="5176306" cy="3532857"/>
           </a:xfrm>
           <a:prstGeom prst="rect">
             <a:avLst/>
@@ -7250,10 +7266,10 @@
       </p:pic>
       <p:sp>
         <p:nvSpPr>
-          <p:cNvPr id="13" name="TextBox 12">
+          <p:cNvPr id="4" name="TextBox 3">
             <a:extLst>
               <a:ext uri="{FF2B5EF4-FFF2-40B4-BE49-F238E27FC236}">
-                <a16:creationId xmlns:a16="http://schemas.microsoft.com/office/drawing/2014/main" id="{9F7F5686-151F-C344-9A21-51F7CD36DC82}"/>
+                <a16:creationId xmlns:a16="http://schemas.microsoft.com/office/drawing/2014/main" id="{682F039E-BE18-CC4F-B105-04ED2B522697}"/>
               </a:ext>
             </a:extLst>
           </p:cNvPr>
@@ -7262,72 +7278,77 @@
         </p:nvSpPr>
         <p:spPr>
           <a:xfrm>
-            <a:off x="723955" y="4479299"/>
-            <a:ext cx="4768980" cy="517065"/>
+            <a:off x="1013254" y="1229968"/>
+            <a:ext cx="5172393" cy="830997"/>
           </a:xfrm>
           <a:prstGeom prst="rect">
             <a:avLst/>
           </a:prstGeom>
-          <a:noFill/>
-        </p:spPr>
-        <p:txBody>
-          <a:bodyPr wrap="square" lIns="118872" tIns="91440" rIns="118872" bIns="91440" rtlCol="0" anchor="ctr" anchorCtr="0">
+          <a:solidFill>
+            <a:schemeClr val="bg2"/>
+          </a:solidFill>
+        </p:spPr>
+        <p:txBody>
+          <a:bodyPr wrap="square" rtlCol="0">
             <a:spAutoFit/>
           </a:bodyPr>
           <a:lstStyle/>
           <a:p>
-            <a:pPr algn="l">
-              <a:lnSpc>
-                <a:spcPct val="90000"/>
-              </a:lnSpc>
-            </a:pPr>
             <a:r>
               <a:rPr lang="en-US" sz="2400" dirty="0"/>
-              <a:t>Click on </a:t>
+              <a:t>Setup Cinema Database Export in </a:t>
             </a:r>
             <a:r>
               <a:rPr lang="en-US" sz="2400" b="1" dirty="0"/>
-              <a:t>Save Cinema D Table</a:t>
-            </a:r>
-          </a:p>
-        </p:txBody>
-      </p:sp>
-      <p:pic>
-        <p:nvPicPr>
-          <p:cNvPr id="11" name="Picture 10">
+              <a:t>Export Inspector View</a:t>
+            </a:r>
+          </a:p>
+        </p:txBody>
+      </p:sp>
+      <p:sp>
+        <p:nvSpPr>
+          <p:cNvPr id="15" name="Title 1">
             <a:extLst>
               <a:ext uri="{FF2B5EF4-FFF2-40B4-BE49-F238E27FC236}">
-                <a16:creationId xmlns:a16="http://schemas.microsoft.com/office/drawing/2014/main" id="{80CCFEA3-7DA1-8E47-9697-7C11B72360B4}"/>
+                <a16:creationId xmlns:a16="http://schemas.microsoft.com/office/drawing/2014/main" id="{D455D1A1-141D-124F-8A8D-31B58287F0F0}"/>
               </a:ext>
             </a:extLst>
           </p:cNvPr>
-          <p:cNvPicPr>
-            <a:picLocks noChangeAspect="1"/>
-          </p:cNvPicPr>
-          <p:nvPr/>
-        </p:nvPicPr>
-        <p:blipFill>
-          <a:blip r:embed="rId4"/>
-          <a:stretch>
-            <a:fillRect/>
-          </a:stretch>
-        </p:blipFill>
-        <p:spPr>
-          <a:xfrm>
-            <a:off x="8449562" y="4033336"/>
-            <a:ext cx="2101897" cy="2736431"/>
-          </a:xfrm>
-          <a:prstGeom prst="rect">
-            <a:avLst/>
-          </a:prstGeom>
-        </p:spPr>
-      </p:pic>
-      <p:sp>
-        <p:nvSpPr>
-          <p:cNvPr id="17" name="TextBox 16">
+          <p:cNvSpPr>
+            <a:spLocks noGrp="1"/>
+          </p:cNvSpPr>
+          <p:nvPr>
+            <p:ph type="title"/>
+          </p:nvPr>
+        </p:nvSpPr>
+        <p:spPr>
+          <a:xfrm>
+            <a:off x="838200" y="365125"/>
+            <a:ext cx="10515600" cy="662781"/>
+          </a:xfrm>
+        </p:spPr>
+        <p:txBody>
+          <a:bodyPr/>
+          <a:lstStyle/>
+          <a:p>
+            <a:r>
+              <a:rPr lang="en-US" dirty="0"/>
+              <a:t>Cinema Workflow Example: Export a CDB from </a:t>
+            </a:r>
+            <a:r>
+              <a:rPr lang="en-US" dirty="0" err="1"/>
+              <a:t>ParaView</a:t>
+            </a:r>
+            <a:endParaRPr lang="en-US" dirty="0"/>
+          </a:p>
+        </p:txBody>
+      </p:sp>
+      <p:sp>
+        <p:nvSpPr>
+          <p:cNvPr id="9" name="TextBox 8">
             <a:extLst>
               <a:ext uri="{FF2B5EF4-FFF2-40B4-BE49-F238E27FC236}">
-                <a16:creationId xmlns:a16="http://schemas.microsoft.com/office/drawing/2014/main" id="{E0671266-9502-1240-B129-A9D740CAE119}"/>
+                <a16:creationId xmlns:a16="http://schemas.microsoft.com/office/drawing/2014/main" id="{9D1CE2DF-DFA4-4E41-9E7B-43AC0EE8194F}"/>
               </a:ext>
             </a:extLst>
           </p:cNvPr>
@@ -7336,8 +7357,8 @@
         </p:nvSpPr>
         <p:spPr>
           <a:xfrm>
-            <a:off x="3888496" y="5488930"/>
-            <a:ext cx="4768980" cy="517065"/>
+            <a:off x="225453" y="2723455"/>
+            <a:ext cx="6747994" cy="517065"/>
           </a:xfrm>
           <a:prstGeom prst="rect">
             <a:avLst/>
@@ -7345,25 +7366,24 @@
           <a:noFill/>
         </p:spPr>
         <p:txBody>
-          <a:bodyPr wrap="square" lIns="118872" tIns="91440" rIns="118872" bIns="91440" rtlCol="0" anchor="ctr" anchorCtr="0">
+          <a:bodyPr wrap="square" lIns="118872" tIns="91440" rIns="118872" bIns="91440" rtlCol="0" anchor="t" anchorCtr="0">
             <a:spAutoFit/>
           </a:bodyPr>
           <a:lstStyle/>
           <a:p>
-            <a:pPr algn="l">
+            <a:pPr>
               <a:lnSpc>
                 <a:spcPct val="90000"/>
               </a:lnSpc>
             </a:pPr>
             <a:r>
+              <a:rPr lang="en-US" sz="2400" b="1" dirty="0"/>
+              <a:t>Root Directory: </a:t>
+            </a:r>
+            <a:r>
               <a:rPr lang="en-US" sz="2400" dirty="0"/>
-              <a:t>Select </a:t>
-            </a:r>
-            <a:r>
-              <a:rPr lang="en-US" sz="2400" b="1" dirty="0"/>
-              <a:t>File &gt; Export Now</a:t>
-            </a:r>
-            <a:endParaRPr lang="en-US" sz="2400" dirty="0"/>
+              <a:t>full path to the output database</a:t>
+            </a:r>
           </a:p>
         </p:txBody>
       </p:sp>
@@ -7381,8 +7401,8 @@
         </p:nvSpPr>
         <p:spPr>
           <a:xfrm>
-            <a:off x="7761249" y="3429000"/>
-            <a:ext cx="1817650" cy="351263"/>
+            <a:off x="6969369" y="4081911"/>
+            <a:ext cx="2450197" cy="374175"/>
           </a:xfrm>
           <a:prstGeom prst="frame">
             <a:avLst>
@@ -7441,8 +7461,8 @@
         </p:nvSpPr>
         <p:spPr>
           <a:xfrm>
-            <a:off x="7761248" y="2897857"/>
-            <a:ext cx="3592551" cy="351263"/>
+            <a:off x="6969371" y="3452729"/>
+            <a:ext cx="4311340" cy="351263"/>
           </a:xfrm>
           <a:prstGeom prst="frame">
             <a:avLst>
@@ -7489,61 +7509,50 @@
       </p:sp>
       <p:sp>
         <p:nvSpPr>
-          <p:cNvPr id="18" name="Frame 17">
+          <p:cNvPr id="16" name="TextBox 15">
             <a:extLst>
               <a:ext uri="{FF2B5EF4-FFF2-40B4-BE49-F238E27FC236}">
-                <a16:creationId xmlns:a16="http://schemas.microsoft.com/office/drawing/2014/main" id="{2D05377D-0934-5B47-9F5E-4294269FABBF}"/>
+                <a16:creationId xmlns:a16="http://schemas.microsoft.com/office/drawing/2014/main" id="{65640808-3F03-2747-A80D-6E03175B9E4A}"/>
               </a:ext>
             </a:extLst>
           </p:cNvPr>
-          <p:cNvSpPr/>
+          <p:cNvSpPr txBox="1"/>
           <p:nvPr/>
         </p:nvSpPr>
         <p:spPr>
           <a:xfrm>
-            <a:off x="8224358" y="5630104"/>
-            <a:ext cx="2536569" cy="351263"/>
-          </a:xfrm>
-          <a:prstGeom prst="frame">
-            <a:avLst>
-              <a:gd name="adj1" fmla="val 8328"/>
-            </a:avLst>
+            <a:off x="225453" y="3548268"/>
+            <a:ext cx="6063380" cy="849463"/>
+          </a:xfrm>
+          <a:prstGeom prst="rect">
+            <a:avLst/>
           </a:prstGeom>
-          <a:solidFill>
-            <a:srgbClr val="FF0000"/>
-          </a:solidFill>
-          <a:ln>
-            <a:solidFill>
-              <a:srgbClr val="FF0000"/>
-            </a:solidFill>
-          </a:ln>
-          <a:effectLst>
-            <a:outerShdw blurRad="44450" dist="27940" dir="5400000" algn="ctr">
-              <a:srgbClr val="000000">
-                <a:alpha val="32000"/>
-              </a:srgbClr>
-            </a:outerShdw>
-          </a:effectLst>
-        </p:spPr>
-        <p:txBody>
-          <a:bodyPr rot="0" spcFirstLastPara="0" vertOverflow="overflow" horzOverflow="overflow" vert="horz" wrap="square" lIns="121851" tIns="60925" rIns="121851" bIns="60925" numCol="1" spcCol="0" rtlCol="0" fromWordArt="0" anchor="ctr" anchorCtr="0" forceAA="0" compatLnSpc="1">
-            <a:prstTxWarp prst="textNoShape">
-              <a:avLst/>
-            </a:prstTxWarp>
-            <a:noAutofit/>
+          <a:noFill/>
+        </p:spPr>
+        <p:txBody>
+          <a:bodyPr wrap="square" lIns="118872" tIns="91440" rIns="118872" bIns="91440" rtlCol="0" anchor="t" anchorCtr="0">
+            <a:spAutoFit/>
           </a:bodyPr>
           <a:lstStyle/>
           <a:p>
-            <a:pPr algn="ctr">
+            <a:pPr>
               <a:lnSpc>
                 <a:spcPct val="90000"/>
               </a:lnSpc>
             </a:pPr>
-            <a:endParaRPr lang="en-US" sz="2000" dirty="0">
-              <a:solidFill>
-                <a:schemeClr val="bg1"/>
-              </a:solidFill>
-            </a:endParaRPr>
+            <a:r>
+              <a:rPr lang="en-US" sz="2400" b="1" dirty="0"/>
+              <a:t>Save Cinema D Table:</a:t>
+            </a:r>
+            <a:r>
+              <a:rPr lang="en-US" sz="2400" dirty="0"/>
+              <a:t> checked to output </a:t>
+            </a:r>
+            <a:r>
+              <a:rPr lang="en-US" sz="2400" dirty="0" err="1"/>
+              <a:t>data.csv</a:t>
+            </a:r>
+            <a:endParaRPr lang="en-US" sz="2400" dirty="0"/>
           </a:p>
         </p:txBody>
       </p:sp>
@@ -7577,6 +7586,207 @@
           <a:chExt cx="0" cy="0"/>
         </a:xfrm>
       </p:grpSpPr>
+      <p:pic>
+        <p:nvPicPr>
+          <p:cNvPr id="21" name="Picture 20">
+            <a:extLst>
+              <a:ext uri="{FF2B5EF4-FFF2-40B4-BE49-F238E27FC236}">
+                <a16:creationId xmlns:a16="http://schemas.microsoft.com/office/drawing/2014/main" id="{F19D463C-DCAF-784C-8FF4-B5A6D97E2590}"/>
+              </a:ext>
+            </a:extLst>
+          </p:cNvPr>
+          <p:cNvPicPr>
+            <a:picLocks noChangeAspect="1"/>
+          </p:cNvPicPr>
+          <p:nvPr/>
+        </p:nvPicPr>
+        <p:blipFill>
+          <a:blip r:embed="rId3"/>
+          <a:stretch>
+            <a:fillRect/>
+          </a:stretch>
+        </p:blipFill>
+        <p:spPr>
+          <a:xfrm>
+            <a:off x="118138" y="2187372"/>
+            <a:ext cx="5674191" cy="3729232"/>
+          </a:xfrm>
+          <a:prstGeom prst="rect">
+            <a:avLst/>
+          </a:prstGeom>
+        </p:spPr>
+      </p:pic>
+      <p:grpSp>
+        <p:nvGrpSpPr>
+          <p:cNvPr id="2" name="Group 1">
+            <a:extLst>
+              <a:ext uri="{FF2B5EF4-FFF2-40B4-BE49-F238E27FC236}">
+                <a16:creationId xmlns:a16="http://schemas.microsoft.com/office/drawing/2014/main" id="{7A5AB81D-C41B-794E-992D-E68E1BB140C2}"/>
+              </a:ext>
+            </a:extLst>
+          </p:cNvPr>
+          <p:cNvGrpSpPr/>
+          <p:nvPr/>
+        </p:nvGrpSpPr>
+        <p:grpSpPr>
+          <a:xfrm>
+            <a:off x="7950862" y="1247628"/>
+            <a:ext cx="3899017" cy="4799574"/>
+            <a:chOff x="5963441" y="1564869"/>
+            <a:chExt cx="3899017" cy="4799574"/>
+          </a:xfrm>
+        </p:grpSpPr>
+        <p:pic>
+          <p:nvPicPr>
+            <p:cNvPr id="11" name="Picture 10">
+              <a:extLst>
+                <a:ext uri="{FF2B5EF4-FFF2-40B4-BE49-F238E27FC236}">
+                  <a16:creationId xmlns:a16="http://schemas.microsoft.com/office/drawing/2014/main" id="{80CCFEA3-7DA1-8E47-9697-7C11B72360B4}"/>
+                </a:ext>
+              </a:extLst>
+            </p:cNvPr>
+            <p:cNvPicPr>
+              <a:picLocks noChangeAspect="1"/>
+            </p:cNvPicPr>
+            <p:nvPr/>
+          </p:nvPicPr>
+          <p:blipFill>
+            <a:blip r:embed="rId4"/>
+            <a:stretch>
+              <a:fillRect/>
+            </a:stretch>
+          </p:blipFill>
+          <p:spPr>
+            <a:xfrm>
+              <a:off x="6096001" y="1564869"/>
+              <a:ext cx="3631756" cy="4728134"/>
+            </a:xfrm>
+            <a:prstGeom prst="rect">
+              <a:avLst/>
+            </a:prstGeom>
+          </p:spPr>
+        </p:pic>
+        <p:sp>
+          <p:nvSpPr>
+            <p:cNvPr id="18" name="Frame 17">
+              <a:extLst>
+                <a:ext uri="{FF2B5EF4-FFF2-40B4-BE49-F238E27FC236}">
+                  <a16:creationId xmlns:a16="http://schemas.microsoft.com/office/drawing/2014/main" id="{2D05377D-0934-5B47-9F5E-4294269FABBF}"/>
+                </a:ext>
+              </a:extLst>
+            </p:cNvPr>
+            <p:cNvSpPr/>
+            <p:nvPr/>
+          </p:nvSpPr>
+          <p:spPr>
+            <a:xfrm>
+              <a:off x="5965583" y="4402872"/>
+              <a:ext cx="3896875" cy="461665"/>
+            </a:xfrm>
+            <a:prstGeom prst="frame">
+              <a:avLst>
+                <a:gd name="adj1" fmla="val 8328"/>
+              </a:avLst>
+            </a:prstGeom>
+            <a:solidFill>
+              <a:srgbClr val="FF0000"/>
+            </a:solidFill>
+            <a:ln>
+              <a:solidFill>
+                <a:srgbClr val="FF0000"/>
+              </a:solidFill>
+            </a:ln>
+            <a:effectLst>
+              <a:outerShdw blurRad="44450" dist="27940" dir="5400000" algn="ctr">
+                <a:srgbClr val="000000">
+                  <a:alpha val="32000"/>
+                </a:srgbClr>
+              </a:outerShdw>
+            </a:effectLst>
+          </p:spPr>
+          <p:txBody>
+            <a:bodyPr rot="0" spcFirstLastPara="0" vertOverflow="overflow" horzOverflow="overflow" vert="horz" wrap="square" lIns="121851" tIns="60925" rIns="121851" bIns="60925" numCol="1" spcCol="0" rtlCol="0" fromWordArt="0" anchor="ctr" anchorCtr="0" forceAA="0" compatLnSpc="1">
+              <a:prstTxWarp prst="textNoShape">
+                <a:avLst/>
+              </a:prstTxWarp>
+              <a:noAutofit/>
+            </a:bodyPr>
+            <a:lstStyle/>
+            <a:p>
+              <a:pPr algn="ctr">
+                <a:lnSpc>
+                  <a:spcPct val="90000"/>
+                </a:lnSpc>
+              </a:pPr>
+              <a:endParaRPr lang="en-US" sz="2000" dirty="0">
+                <a:solidFill>
+                  <a:schemeClr val="bg1"/>
+                </a:solidFill>
+              </a:endParaRPr>
+            </a:p>
+          </p:txBody>
+        </p:sp>
+        <p:sp>
+          <p:nvSpPr>
+            <p:cNvPr id="20" name="Frame 19">
+              <a:extLst>
+                <a:ext uri="{FF2B5EF4-FFF2-40B4-BE49-F238E27FC236}">
+                  <a16:creationId xmlns:a16="http://schemas.microsoft.com/office/drawing/2014/main" id="{F1325C2E-D446-A747-8D5B-9D4761EFE8FC}"/>
+                </a:ext>
+              </a:extLst>
+            </p:cNvPr>
+            <p:cNvSpPr/>
+            <p:nvPr/>
+          </p:nvSpPr>
+          <p:spPr>
+            <a:xfrm>
+              <a:off x="5963441" y="5902778"/>
+              <a:ext cx="3896875" cy="461665"/>
+            </a:xfrm>
+            <a:prstGeom prst="frame">
+              <a:avLst>
+                <a:gd name="adj1" fmla="val 8328"/>
+              </a:avLst>
+            </a:prstGeom>
+            <a:solidFill>
+              <a:srgbClr val="FF0000"/>
+            </a:solidFill>
+            <a:ln>
+              <a:solidFill>
+                <a:srgbClr val="FF0000"/>
+              </a:solidFill>
+            </a:ln>
+            <a:effectLst>
+              <a:outerShdw blurRad="44450" dist="27940" dir="5400000" algn="ctr">
+                <a:srgbClr val="000000">
+                  <a:alpha val="32000"/>
+                </a:srgbClr>
+              </a:outerShdw>
+            </a:effectLst>
+          </p:spPr>
+          <p:txBody>
+            <a:bodyPr rot="0" spcFirstLastPara="0" vertOverflow="overflow" horzOverflow="overflow" vert="horz" wrap="square" lIns="121851" tIns="60925" rIns="121851" bIns="60925" numCol="1" spcCol="0" rtlCol="0" fromWordArt="0" anchor="ctr" anchorCtr="0" forceAA="0" compatLnSpc="1">
+              <a:prstTxWarp prst="textNoShape">
+                <a:avLst/>
+              </a:prstTxWarp>
+              <a:noAutofit/>
+            </a:bodyPr>
+            <a:lstStyle/>
+            <a:p>
+              <a:pPr algn="ctr">
+                <a:lnSpc>
+                  <a:spcPct val="90000"/>
+                </a:lnSpc>
+              </a:pPr>
+              <a:endParaRPr lang="en-US" sz="2000" dirty="0">
+                <a:solidFill>
+                  <a:schemeClr val="bg1"/>
+                </a:solidFill>
+              </a:endParaRPr>
+            </a:p>
+          </p:txBody>
+        </p:sp>
+      </p:grpSp>
       <p:sp>
         <p:nvSpPr>
           <p:cNvPr id="4" name="TextBox 3">
@@ -7591,14 +7801,16 @@
         </p:nvSpPr>
         <p:spPr>
           <a:xfrm>
-            <a:off x="1013254" y="1229968"/>
-            <a:ext cx="5172393" cy="830997"/>
+            <a:off x="5927030" y="3278113"/>
+            <a:ext cx="4299919" cy="461665"/>
           </a:xfrm>
           <a:prstGeom prst="rect">
             <a:avLst/>
           </a:prstGeom>
           <a:solidFill>
-            <a:schemeClr val="bg2"/>
+            <a:schemeClr val="bg1">
+              <a:lumMod val="85000"/>
+            </a:schemeClr>
           </a:solidFill>
         </p:spPr>
         <p:txBody>
@@ -7609,19 +7821,11 @@
           <a:p>
             <a:r>
               <a:rPr lang="en-US" sz="2400" dirty="0"/>
-              <a:t>Use </a:t>
-            </a:r>
-            <a:r>
-              <a:rPr lang="en-US" sz="2400" dirty="0" err="1"/>
-              <a:t>CinemaCompare</a:t>
-            </a:r>
-            <a:r>
-              <a:rPr lang="en-US" sz="2400" dirty="0"/>
-              <a:t> viewer to explore </a:t>
-            </a:r>
-            <a:r>
-              <a:rPr lang="en-US" sz="2400" dirty="0" err="1"/>
-              <a:t>nyx.cdb</a:t>
+              <a:t>Export via </a:t>
+            </a:r>
+            <a:r>
+              <a:rPr lang="en-US" sz="2400" b="1" dirty="0"/>
+              <a:t>File &gt; Export Now</a:t>
             </a:r>
             <a:endParaRPr lang="en-US" sz="2400" dirty="0"/>
           </a:p>
@@ -7667,6 +7871,173 @@
       </p:sp>
       <p:sp>
         <p:nvSpPr>
+          <p:cNvPr id="13" name="TextBox 12">
+            <a:extLst>
+              <a:ext uri="{FF2B5EF4-FFF2-40B4-BE49-F238E27FC236}">
+                <a16:creationId xmlns:a16="http://schemas.microsoft.com/office/drawing/2014/main" id="{5A19848C-8774-6842-A9F8-CC160A4C3077}"/>
+              </a:ext>
+            </a:extLst>
+          </p:cNvPr>
+          <p:cNvSpPr txBox="1"/>
+          <p:nvPr/>
+        </p:nvSpPr>
+        <p:spPr>
+          <a:xfrm>
+            <a:off x="5927030" y="6232850"/>
+            <a:ext cx="2953248" cy="517065"/>
+          </a:xfrm>
+          <a:prstGeom prst="rect">
+            <a:avLst/>
+          </a:prstGeom>
+          <a:solidFill>
+            <a:schemeClr val="bg1">
+              <a:lumMod val="85000"/>
+            </a:schemeClr>
+          </a:solidFill>
+        </p:spPr>
+        <p:txBody>
+          <a:bodyPr wrap="square" lIns="118872" tIns="91440" rIns="118872" bIns="91440" rtlCol="0" anchor="ctr" anchorCtr="0">
+            <a:spAutoFit/>
+          </a:bodyPr>
+          <a:lstStyle/>
+          <a:p>
+            <a:pPr algn="l">
+              <a:lnSpc>
+                <a:spcPct val="90000"/>
+              </a:lnSpc>
+            </a:pPr>
+            <a:r>
+              <a:rPr lang="en-US" sz="2400" dirty="0"/>
+              <a:t>Exit via </a:t>
+            </a:r>
+            <a:r>
+              <a:rPr lang="en-US" sz="2400" b="1" dirty="0"/>
+              <a:t>File &gt; Exit </a:t>
+            </a:r>
+            <a:endParaRPr lang="en-US" sz="2400" dirty="0"/>
+          </a:p>
+        </p:txBody>
+      </p:sp>
+    </p:spTree>
+    <p:extLst>
+      <p:ext uri="{BB962C8B-B14F-4D97-AF65-F5344CB8AC3E}">
+        <p14:creationId xmlns:p14="http://schemas.microsoft.com/office/powerpoint/2010/main" val="1925482751"/>
+      </p:ext>
+    </p:extLst>
+  </p:cSld>
+  <p:clrMapOvr>
+    <a:masterClrMapping/>
+  </p:clrMapOvr>
+</p:sld>
+</file>
+
+<file path=ppt/slides/slide7.xml><?xml version="1.0" encoding="utf-8"?>
+<p:sld xmlns:a="http://schemas.openxmlformats.org/drawingml/2006/main" xmlns:r="http://schemas.openxmlformats.org/officeDocument/2006/relationships" xmlns:p="http://schemas.openxmlformats.org/presentationml/2006/main">
+  <p:cSld>
+    <p:spTree>
+      <p:nvGrpSpPr>
+        <p:cNvPr id="1" name=""/>
+        <p:cNvGrpSpPr/>
+        <p:nvPr/>
+      </p:nvGrpSpPr>
+      <p:grpSpPr>
+        <a:xfrm>
+          <a:off x="0" y="0"/>
+          <a:ext cx="0" cy="0"/>
+          <a:chOff x="0" y="0"/>
+          <a:chExt cx="0" cy="0"/>
+        </a:xfrm>
+      </p:grpSpPr>
+      <p:sp>
+        <p:nvSpPr>
+          <p:cNvPr id="4" name="TextBox 3">
+            <a:extLst>
+              <a:ext uri="{FF2B5EF4-FFF2-40B4-BE49-F238E27FC236}">
+                <a16:creationId xmlns:a16="http://schemas.microsoft.com/office/drawing/2014/main" id="{682F039E-BE18-CC4F-B105-04ED2B522697}"/>
+              </a:ext>
+            </a:extLst>
+          </p:cNvPr>
+          <p:cNvSpPr txBox="1"/>
+          <p:nvPr/>
+        </p:nvSpPr>
+        <p:spPr>
+          <a:xfrm>
+            <a:off x="1013254" y="1229968"/>
+            <a:ext cx="5172393" cy="830997"/>
+          </a:xfrm>
+          <a:prstGeom prst="rect">
+            <a:avLst/>
+          </a:prstGeom>
+          <a:solidFill>
+            <a:schemeClr val="bg2"/>
+          </a:solidFill>
+        </p:spPr>
+        <p:txBody>
+          <a:bodyPr wrap="square" rtlCol="0">
+            <a:spAutoFit/>
+          </a:bodyPr>
+          <a:lstStyle/>
+          <a:p>
+            <a:r>
+              <a:rPr lang="en-US" sz="2400" dirty="0"/>
+              <a:t>Use </a:t>
+            </a:r>
+            <a:r>
+              <a:rPr lang="en-US" sz="2400" dirty="0" err="1"/>
+              <a:t>CinemaCompare</a:t>
+            </a:r>
+            <a:r>
+              <a:rPr lang="en-US" sz="2400" dirty="0"/>
+              <a:t> viewer to explore </a:t>
+            </a:r>
+            <a:r>
+              <a:rPr lang="en-US" sz="2400" dirty="0" err="1"/>
+              <a:t>nyx.cdb</a:t>
+            </a:r>
+            <a:endParaRPr lang="en-US" sz="2400" dirty="0"/>
+          </a:p>
+        </p:txBody>
+      </p:sp>
+      <p:sp>
+        <p:nvSpPr>
+          <p:cNvPr id="15" name="Title 1">
+            <a:extLst>
+              <a:ext uri="{FF2B5EF4-FFF2-40B4-BE49-F238E27FC236}">
+                <a16:creationId xmlns:a16="http://schemas.microsoft.com/office/drawing/2014/main" id="{D455D1A1-141D-124F-8A8D-31B58287F0F0}"/>
+              </a:ext>
+            </a:extLst>
+          </p:cNvPr>
+          <p:cNvSpPr>
+            <a:spLocks noGrp="1"/>
+          </p:cNvSpPr>
+          <p:nvPr>
+            <p:ph type="title"/>
+          </p:nvPr>
+        </p:nvSpPr>
+        <p:spPr>
+          <a:xfrm>
+            <a:off x="838200" y="365125"/>
+            <a:ext cx="10515600" cy="662781"/>
+          </a:xfrm>
+        </p:spPr>
+        <p:txBody>
+          <a:bodyPr/>
+          <a:lstStyle/>
+          <a:p>
+            <a:r>
+              <a:rPr lang="en-US" dirty="0"/>
+              <a:t>Cinema Workflow Example: Export a CDB from </a:t>
+            </a:r>
+            <a:r>
+              <a:rPr lang="en-US" dirty="0" err="1"/>
+              <a:t>ParaView</a:t>
+            </a:r>
+            <a:endParaRPr lang="en-US" dirty="0"/>
+          </a:p>
+        </p:txBody>
+      </p:sp>
+      <p:sp>
+        <p:nvSpPr>
           <p:cNvPr id="12" name="TextBox 11">
             <a:extLst>
               <a:ext uri="{FF2B5EF4-FFF2-40B4-BE49-F238E27FC236}">
@@ -7748,63 +8119,6 @@
               <a:latin typeface="Courier New" panose="02070309020205020404" pitchFamily="49" charset="0"/>
               <a:cs typeface="Courier New" panose="02070309020205020404" pitchFamily="49" charset="0"/>
             </a:endParaRPr>
-          </a:p>
-        </p:txBody>
-      </p:sp>
-      <p:sp>
-        <p:nvSpPr>
-          <p:cNvPr id="14" name="TextBox 13">
-            <a:extLst>
-              <a:ext uri="{FF2B5EF4-FFF2-40B4-BE49-F238E27FC236}">
-                <a16:creationId xmlns:a16="http://schemas.microsoft.com/office/drawing/2014/main" id="{D4AE1369-94DB-1146-ACD3-AE2AFB0B1A84}"/>
-              </a:ext>
-            </a:extLst>
-          </p:cNvPr>
-          <p:cNvSpPr txBox="1"/>
-          <p:nvPr/>
-        </p:nvSpPr>
-        <p:spPr>
-          <a:xfrm>
-            <a:off x="909625" y="2307839"/>
-            <a:ext cx="4982127" cy="517065"/>
-          </a:xfrm>
-          <a:prstGeom prst="rect">
-            <a:avLst/>
-          </a:prstGeom>
-          <a:noFill/>
-        </p:spPr>
-        <p:txBody>
-          <a:bodyPr wrap="square" lIns="118872" tIns="91440" rIns="118872" bIns="91440" rtlCol="0" anchor="ctr" anchorCtr="0">
-            <a:spAutoFit/>
-          </a:bodyPr>
-          <a:lstStyle/>
-          <a:p>
-            <a:pPr algn="l">
-              <a:lnSpc>
-                <a:spcPct val="90000"/>
-              </a:lnSpc>
-            </a:pPr>
-            <a:r>
-              <a:rPr lang="en-US" sz="2400" dirty="0"/>
-              <a:t>Select </a:t>
-            </a:r>
-            <a:r>
-              <a:rPr lang="en-US" sz="2400" b="1" dirty="0"/>
-              <a:t>File &gt; Exit </a:t>
-            </a:r>
-            <a:r>
-              <a:rPr lang="en-US" sz="2000" dirty="0"/>
-              <a:t>(to exit </a:t>
-            </a:r>
-            <a:r>
-              <a:rPr lang="en-US" sz="2000" dirty="0" err="1"/>
-              <a:t>ParaView</a:t>
-            </a:r>
-            <a:r>
-              <a:rPr lang="en-US" sz="2000" dirty="0"/>
-              <a:t>)</a:t>
-            </a:r>
-            <a:endParaRPr lang="en-US" sz="2400" dirty="0"/>
           </a:p>
         </p:txBody>
       </p:sp>
@@ -7950,7 +8264,7 @@
           </a:xfrm>
           <a:prstGeom prst="frame">
             <a:avLst>
-              <a:gd name="adj1" fmla="val 5514"/>
+              <a:gd name="adj1" fmla="val 3945"/>
             </a:avLst>
           </a:prstGeom>
           <a:solidFill>

</xml_diff>

<commit_message>
update pptx and tutorial.md
</commit_message>
<xml_diff>
--- a/2019-11_SC19/workflow_powerpoint/Cinema_Workflow_PV_Export.pptx
+++ b/2019-11_SC19/workflow_powerpoint/Cinema_Workflow_PV_Export.pptx
@@ -203,7 +203,7 @@
           <a:p>
             <a:fld id="{2D3E0540-3CA1-5D45-A099-B65CFF8AE939}" type="datetimeFigureOut">
               <a:rPr lang="en-US" smtClean="0"/>
-              <a:t>11/7/19</a:t>
+              <a:t>11/12/19</a:t>
             </a:fld>
             <a:endParaRPr lang="en-US"/>
           </a:p>
@@ -8050,8 +8050,8 @@
         </p:nvSpPr>
         <p:spPr>
           <a:xfrm>
-            <a:off x="468167" y="5296604"/>
-            <a:ext cx="7019180" cy="469359"/>
+            <a:off x="468167" y="5062908"/>
+            <a:ext cx="6298408" cy="469359"/>
           </a:xfrm>
           <a:prstGeom prst="rect">
             <a:avLst/>
@@ -8092,21 +8092,7 @@
                 <a:latin typeface="Courier New" panose="02070309020205020404" pitchFamily="49" charset="0"/>
                 <a:cs typeface="Courier New" panose="02070309020205020404" pitchFamily="49" charset="0"/>
               </a:rPr>
-              <a:t> </a:t>
-            </a:r>
-            <a:r>
-              <a:rPr lang="en-US" sz="2000" dirty="0" err="1">
-                <a:latin typeface="Courier New" panose="02070309020205020404" pitchFamily="49" charset="0"/>
-                <a:cs typeface="Courier New" panose="02070309020205020404" pitchFamily="49" charset="0"/>
-              </a:rPr>
-              <a:t>cinema_compare</a:t>
-            </a:r>
-            <a:r>
-              <a:rPr lang="en-US" sz="2000" dirty="0">
-                <a:latin typeface="Courier New" panose="02070309020205020404" pitchFamily="49" charset="0"/>
-                <a:cs typeface="Courier New" panose="02070309020205020404" pitchFamily="49" charset="0"/>
-              </a:rPr>
-              <a:t>/</a:t>
+              <a:t> materials/</a:t>
             </a:r>
             <a:r>
               <a:rPr lang="en-US" sz="2000" dirty="0" err="1">
@@ -8192,7 +8178,7 @@
         </p:blipFill>
         <p:spPr>
           <a:xfrm>
-            <a:off x="5755914" y="974414"/>
+            <a:off x="5746584" y="911747"/>
             <a:ext cx="6298408" cy="4120128"/>
           </a:xfrm>
           <a:prstGeom prst="rect">
@@ -8301,6 +8287,118 @@
               <a:solidFill>
                 <a:schemeClr val="bg1"/>
               </a:solidFill>
+            </a:endParaRPr>
+          </a:p>
+        </p:txBody>
+      </p:sp>
+      <p:sp>
+        <p:nvSpPr>
+          <p:cNvPr id="2" name="TextBox 1">
+            <a:extLst>
+              <a:ext uri="{FF2B5EF4-FFF2-40B4-BE49-F238E27FC236}">
+                <a16:creationId xmlns:a16="http://schemas.microsoft.com/office/drawing/2014/main" id="{0D6E44EA-26F6-C049-9929-EBA064C33DE5}"/>
+              </a:ext>
+            </a:extLst>
+          </p:cNvPr>
+          <p:cNvSpPr txBox="1"/>
+          <p:nvPr/>
+        </p:nvSpPr>
+        <p:spPr>
+          <a:xfrm>
+            <a:off x="4631522" y="5887499"/>
+            <a:ext cx="7154355" cy="433965"/>
+          </a:xfrm>
+          <a:prstGeom prst="rect">
+            <a:avLst/>
+          </a:prstGeom>
+          <a:noFill/>
+        </p:spPr>
+        <p:txBody>
+          <a:bodyPr wrap="square" lIns="118872" tIns="91440" rIns="118872" bIns="91440" rtlCol="0" anchor="ctr" anchorCtr="0">
+            <a:spAutoFit/>
+          </a:bodyPr>
+          <a:lstStyle/>
+          <a:p>
+            <a:pPr algn="l">
+              <a:lnSpc>
+                <a:spcPct val="90000"/>
+              </a:lnSpc>
+            </a:pPr>
+            <a:r>
+              <a:rPr lang="en-US" dirty="0"/>
+              <a:t>Didn’t run the workflow?  You can still look at an example CDB:</a:t>
+            </a:r>
+          </a:p>
+        </p:txBody>
+      </p:sp>
+      <p:sp>
+        <p:nvSpPr>
+          <p:cNvPr id="10" name="TextBox 9">
+            <a:extLst>
+              <a:ext uri="{FF2B5EF4-FFF2-40B4-BE49-F238E27FC236}">
+                <a16:creationId xmlns:a16="http://schemas.microsoft.com/office/drawing/2014/main" id="{FE737707-1E3E-9C48-8BAB-3C82337D18F8}"/>
+              </a:ext>
+            </a:extLst>
+          </p:cNvPr>
+          <p:cNvSpPr txBox="1"/>
+          <p:nvPr/>
+        </p:nvSpPr>
+        <p:spPr>
+          <a:xfrm>
+            <a:off x="4699110" y="6258195"/>
+            <a:ext cx="6404319" cy="469359"/>
+          </a:xfrm>
+          <a:prstGeom prst="rect">
+            <a:avLst/>
+          </a:prstGeom>
+          <a:solidFill>
+            <a:schemeClr val="bg1">
+              <a:lumMod val="85000"/>
+            </a:schemeClr>
+          </a:solidFill>
+        </p:spPr>
+        <p:txBody>
+          <a:bodyPr wrap="square" lIns="118872" tIns="91440" rIns="118872" bIns="91440" rtlCol="0" anchor="t" anchorCtr="0">
+            <a:spAutoFit/>
+          </a:bodyPr>
+          <a:lstStyle/>
+          <a:p>
+            <a:pPr>
+              <a:lnSpc>
+                <a:spcPct val="90000"/>
+              </a:lnSpc>
+            </a:pPr>
+            <a:r>
+              <a:rPr lang="en-US" sz="2000" dirty="0">
+                <a:latin typeface="Courier New" panose="02070309020205020404" pitchFamily="49" charset="0"/>
+                <a:cs typeface="Courier New" panose="02070309020205020404" pitchFamily="49" charset="0"/>
+              </a:rPr>
+              <a:t>$ </a:t>
+            </a:r>
+            <a:r>
+              <a:rPr lang="en-US" sz="2000" dirty="0" err="1">
+                <a:latin typeface="Courier New" panose="02070309020205020404" pitchFamily="49" charset="0"/>
+                <a:cs typeface="Courier New" panose="02070309020205020404" pitchFamily="49" charset="0"/>
+              </a:rPr>
+              <a:t>firefox</a:t>
+            </a:r>
+            <a:r>
+              <a:rPr lang="en-US" sz="2000" dirty="0">
+                <a:latin typeface="Courier New" panose="02070309020205020404" pitchFamily="49" charset="0"/>
+                <a:cs typeface="Courier New" panose="02070309020205020404" pitchFamily="49" charset="0"/>
+              </a:rPr>
+              <a:t> materials/</a:t>
+            </a:r>
+            <a:r>
+              <a:rPr lang="en-US" sz="2000" dirty="0" err="1">
+                <a:latin typeface="Courier New" panose="02070309020205020404" pitchFamily="49" charset="0"/>
+                <a:cs typeface="Courier New" panose="02070309020205020404" pitchFamily="49" charset="0"/>
+              </a:rPr>
+              <a:t>example_compare.html</a:t>
+            </a:r>
+            <a:endParaRPr lang="en-US" sz="2000" dirty="0">
+              <a:latin typeface="Courier New" panose="02070309020205020404" pitchFamily="49" charset="0"/>
+              <a:cs typeface="Courier New" panose="02070309020205020404" pitchFamily="49" charset="0"/>
             </a:endParaRPr>
           </a:p>
         </p:txBody>

</xml_diff>